<commit_message>
Added Doug Sahm pano and HOPE photosynth to report.
</commit_message>
<xml_diff>
--- a/assignments/hw10/CompPhoto-GT-A10-Template.pptx
+++ b/assignments/hw10/CompPhoto-GT-A10-Template.pptx
@@ -233,6 +233,11 @@
       </a:defRPr>
     </a:lvl9pPr>
   </p:defaultTextStyle>
+  <p:extLst>
+    <p:ext uri="{EFAFB233-063F-42B5-8137-9DF3F51BA10A}">
+      <p15:sldGuideLst xmlns:p15="http://schemas.microsoft.com/office/powerpoint/2012/main"/>
+    </p:ext>
+  </p:extLst>
 </p:presentation>
 </file>
 
@@ -652,6 +657,11 @@
               <a:rPr lang="en-US" baseline="0" dirty="0" smtClean="0"/>
               <a:t> street on Halloween, </a:t>
             </a:r>
+            <a:r>
+              <a:rPr lang="en-US" baseline="0" dirty="0" smtClean="0"/>
+              <a:t>drone approach</a:t>
+            </a:r>
+            <a:endParaRPr lang="en-US" baseline="0" dirty="0" smtClean="0"/>
           </a:p>
           <a:p>
             <a:pPr marL="171450" indent="-171450">
@@ -1737,7 +1747,23 @@
               </a:spcBef>
               <a:buNone/>
             </a:pPr>
-            <a:endParaRPr/>
+            <a:r>
+              <a:rPr lang="en-US" dirty="0" smtClean="0"/>
+              <a:t>Artifacts in Site</a:t>
+            </a:r>
+            <a:r>
+              <a:rPr lang="en-US" baseline="0" dirty="0" smtClean="0"/>
+              <a:t> 1 Photosynth, take more pictures? Occlusions, dynamic objects (people) make for a cooler, livelier effect and adds to 3-dimensioanal</a:t>
+            </a:r>
+          </a:p>
+          <a:p>
+            <a:pPr>
+              <a:spcBef>
+                <a:spcPts val="0"/>
+              </a:spcBef>
+              <a:buNone/>
+            </a:pPr>
+            <a:endParaRPr dirty="0"/>
           </a:p>
         </p:txBody>
       </p:sp>
@@ -4029,6 +4055,13 @@
   <p:transition spd="slow">
     <p:cut/>
   </p:transition>
+  <p:timing>
+    <p:tnLst>
+      <p:par>
+        <p:cTn id="1" dur="indefinite" restart="never" nodeType="tmRoot"/>
+      </p:par>
+    </p:tnLst>
+  </p:timing>
 </p:sld>
 </file>
 
@@ -4415,6 +4448,63 @@
           </a:bodyPr>
           <a:lstStyle/>
           <a:p>
+            <a:r>
+              <a:rPr lang="en" sz="2400" dirty="0"/>
+              <a:t>Site 1</a:t>
+            </a:r>
+            <a:r>
+              <a:rPr lang="en" sz="2400" dirty="0"/>
+              <a:t>: </a:t>
+            </a:r>
+            <a:r>
+              <a:rPr lang="en" sz="2400" dirty="0" smtClean="0"/>
+              <a:t>Photosynth of HOPE </a:t>
+            </a:r>
+            <a:r>
+              <a:rPr lang="en" sz="2400" dirty="0"/>
+              <a:t>Outdoor Gallery in Austin, TX</a:t>
+            </a:r>
+          </a:p>
+          <a:p>
+            <a:r>
+              <a:rPr lang="en" sz="2400" dirty="0"/>
+              <a:t>	A collection of graffiti wall art in a residential area</a:t>
+            </a:r>
+            <a:r>
+              <a:rPr lang="en" sz="2400" dirty="0" smtClean="0"/>
+              <a:t>.</a:t>
+            </a:r>
+            <a:endParaRPr lang="en" sz="2400" dirty="0" smtClean="0"/>
+          </a:p>
+          <a:p>
+            <a:r>
+              <a:rPr lang="en" sz="2400" dirty="0" smtClean="0"/>
+              <a:t>Site 2</a:t>
+            </a:r>
+            <a:r>
+              <a:rPr lang="en" sz="2400" dirty="0"/>
+              <a:t>: </a:t>
+            </a:r>
+            <a:r>
+              <a:rPr lang="en" sz="2400" dirty="0" smtClean="0"/>
+              <a:t>Panorama taken at Doug </a:t>
+            </a:r>
+            <a:r>
+              <a:rPr lang="en" sz="2400" dirty="0"/>
+              <a:t>Sahm Hill in Austin, TX</a:t>
+            </a:r>
+          </a:p>
+          <a:p>
+            <a:r>
+              <a:rPr lang="en" sz="2400" dirty="0"/>
+              <a:t>	</a:t>
+            </a:r>
+            <a:r>
+              <a:rPr lang="en" sz="2400" dirty="0"/>
+              <a:t>A scenic hilltop in a park near downtown. </a:t>
+            </a:r>
+          </a:p>
+          <a:p>
             <a:pPr rtl="0">
               <a:spcBef>
                 <a:spcPts val="0"/>
@@ -4422,93 +4512,68 @@
               <a:buNone/>
             </a:pPr>
             <a:r>
-              <a:rPr lang="en" sz="2400"/>
-              <a:t>Site 1:</a:t>
-            </a:r>
-          </a:p>
-          <a:p>
-            <a:pPr rtl="0">
+              <a:rPr lang="en" sz="2400" dirty="0" smtClean="0"/>
+              <a:t>Site 3: Zilker Park panorama</a:t>
+            </a:r>
+            <a:endParaRPr lang="en" sz="2400" dirty="0"/>
+          </a:p>
+          <a:p>
+            <a:pPr>
               <a:spcBef>
                 <a:spcPts val="0"/>
               </a:spcBef>
               <a:buNone/>
             </a:pPr>
             <a:r>
-              <a:rPr lang="en" sz="2400"/>
-              <a:t>	Location </a:t>
-            </a:r>
-          </a:p>
-          <a:p>
-            <a:pPr rtl="0">
+              <a:rPr lang="en" sz="2400" dirty="0"/>
+              <a:t>	</a:t>
+            </a:r>
+            <a:r>
+              <a:rPr lang="en" sz="2400" dirty="0" smtClean="0"/>
+              <a:t>Flyby at Zilker Park in Austin, TX.</a:t>
+            </a:r>
+          </a:p>
+          <a:p>
+            <a:r>
+              <a:rPr lang="en" sz="2400" dirty="0"/>
+              <a:t>Site </a:t>
+            </a:r>
+            <a:r>
+              <a:rPr lang="en" sz="2400" dirty="0" smtClean="0"/>
+              <a:t>4: Walk Photosynth at la Barbecue food truck</a:t>
+            </a:r>
+            <a:endParaRPr lang="en" sz="2400" dirty="0"/>
+          </a:p>
+          <a:p>
+            <a:r>
+              <a:rPr lang="en" sz="2400" dirty="0"/>
+              <a:t>	</a:t>
+            </a:r>
+            <a:r>
+              <a:rPr lang="en" sz="2400" dirty="0" smtClean="0"/>
+              <a:t>P</a:t>
+            </a:r>
+            <a:r>
+              <a:rPr lang="en-US" sz="2400" dirty="0" err="1" smtClean="0"/>
+              <a:t>eo</a:t>
+            </a:r>
+            <a:r>
+              <a:rPr lang="en" sz="2400" dirty="0" smtClean="0"/>
+              <a:t>ple line up to eat Texas BBQ at one of the best places in Austin</a:t>
+            </a:r>
+            <a:r>
+              <a:rPr lang="en" sz="2400" dirty="0"/>
+              <a:t>, TX.</a:t>
+            </a:r>
+          </a:p>
+          <a:p>
+            <a:pPr>
               <a:spcBef>
                 <a:spcPts val="0"/>
               </a:spcBef>
               <a:buNone/>
             </a:pPr>
-            <a:r>
-              <a:rPr lang="en" sz="2400"/>
-              <a:t>	Description</a:t>
-            </a:r>
-          </a:p>
-          <a:p>
-            <a:pPr rtl="0">
-              <a:spcBef>
-                <a:spcPts val="0"/>
-              </a:spcBef>
-              <a:buNone/>
-            </a:pPr>
-            <a:r>
-              <a:rPr lang="en" sz="2400"/>
-              <a:t>Site 2:</a:t>
-            </a:r>
-          </a:p>
-          <a:p>
-            <a:pPr rtl="0">
-              <a:spcBef>
-                <a:spcPts val="0"/>
-              </a:spcBef>
-              <a:buNone/>
-            </a:pPr>
-            <a:r>
-              <a:rPr lang="en" sz="2400"/>
-              <a:t>	Location</a:t>
-            </a:r>
-          </a:p>
-          <a:p>
-            <a:pPr rtl="0">
-              <a:spcBef>
-                <a:spcPts val="0"/>
-              </a:spcBef>
-              <a:buNone/>
-            </a:pPr>
-            <a:r>
-              <a:rPr lang="en" sz="2400"/>
-              <a:t>	Description</a:t>
-            </a:r>
-          </a:p>
-          <a:p>
-            <a:pPr rtl="0">
-              <a:spcBef>
-                <a:spcPts val="0"/>
-              </a:spcBef>
-              <a:buNone/>
-            </a:pPr>
-            <a:r>
-              <a:rPr lang="en" sz="2400"/>
-              <a:t>Site 3 (and more, OPTIONAL)</a:t>
-            </a:r>
-          </a:p>
-          <a:p>
-            <a:pPr>
-              <a:spcBef>
-                <a:spcPts val="0"/>
-              </a:spcBef>
-              <a:buNone/>
-            </a:pPr>
-            <a:r>
-              <a:rPr lang="en" sz="2400"/>
-              <a:t>	Location</a:t>
-            </a:r>
+            <a:endParaRPr lang="en" sz="2400" dirty="0"/>
           </a:p>
         </p:txBody>
       </p:sp>
@@ -4600,6 +4665,13 @@
   <p:transition spd="slow">
     <p:cut/>
   </p:transition>
+  <p:timing>
+    <p:tnLst>
+      <p:par>
+        <p:cTn id="1" dur="indefinite" restart="never" nodeType="tmRoot"/>
+      </p:par>
+    </p:tnLst>
+  </p:timing>
 </p:sld>
 </file>
 
@@ -4652,9 +4724,18 @@
               <a:buNone/>
             </a:pPr>
             <a:r>
-              <a:rPr lang="en" sz="3000"/>
-              <a:t>Site 1 (Photosynth)</a:t>
-            </a:r>
+              <a:rPr lang="en" sz="3000" dirty="0"/>
+              <a:t>Site </a:t>
+            </a:r>
+            <a:r>
+              <a:rPr lang="en" sz="3000" dirty="0" smtClean="0"/>
+              <a:t>1: </a:t>
+            </a:r>
+            <a:r>
+              <a:rPr lang="en" sz="3000" dirty="0" smtClean="0"/>
+              <a:t>Photosynth of HOPE Outdoor Gallery</a:t>
+            </a:r>
+            <a:endParaRPr lang="en" sz="3000" dirty="0"/>
           </a:p>
         </p:txBody>
       </p:sp>
@@ -4683,66 +4764,31 @@
           </a:bodyPr>
           <a:lstStyle/>
           <a:p>
-            <a:pPr marL="457200" marR="0" lvl="0" indent="-228600" algn="l" rtl="0">
-              <a:lnSpc>
-                <a:spcPct val="100000"/>
-              </a:lnSpc>
+            <a:pPr marL="457200" lvl="0" indent="-228600">
               <a:spcBef>
                 <a:spcPts val="600"/>
               </a:spcBef>
-              <a:spcAft>
-                <a:spcPts val="0"/>
-              </a:spcAft>
               <a:buClr>
                 <a:srgbClr val="000000"/>
               </a:buClr>
-              <a:buSzPct val="100000"/>
               <a:buFont typeface="Arial"/>
             </a:pPr>
             <a:r>
-              <a:rPr lang="en"/>
-              <a:t>How many pictures?</a:t>
-            </a:r>
-          </a:p>
-          <a:p>
-            <a:pPr marL="457200" marR="0" lvl="0" indent="-228600" algn="l" rtl="0">
-              <a:lnSpc>
-                <a:spcPct val="100000"/>
-              </a:lnSpc>
+              <a:rPr lang="en" sz="2000" dirty="0" smtClean="0"/>
+              <a:t>This wall photosynth consisted of 21 photographs.</a:t>
+            </a:r>
+          </a:p>
+          <a:p>
+            <a:pPr marL="457200" lvl="0" indent="-228600">
               <a:spcBef>
                 <a:spcPts val="600"/>
               </a:spcBef>
-              <a:spcAft>
-                <a:spcPts val="0"/>
-              </a:spcAft>
+              <a:buClr>
+                <a:srgbClr val="000000"/>
+              </a:buClr>
+              <a:buFont typeface="Arial"/>
             </a:pPr>
-            <a:r>
-              <a:rPr lang="en"/>
-              <a:t>Share a few representative ones here.</a:t>
-            </a:r>
-          </a:p>
-          <a:p>
-            <a:pPr marL="457200" marR="0" lvl="0" indent="-228600" algn="l" rtl="0">
-              <a:lnSpc>
-                <a:spcPct val="100000"/>
-              </a:lnSpc>
-              <a:spcBef>
-                <a:spcPts val="600"/>
-              </a:spcBef>
-              <a:spcAft>
-                <a:spcPts val="0"/>
-              </a:spcAft>
-            </a:pPr>
-            <a:endParaRPr/>
-          </a:p>
-          <a:p>
-            <a:pPr>
-              <a:spcBef>
-                <a:spcPts val="0"/>
-              </a:spcBef>
-              <a:buNone/>
-            </a:pPr>
-            <a:endParaRPr/>
+            <a:endParaRPr lang="en" sz="2000" dirty="0"/>
           </a:p>
         </p:txBody>
       </p:sp>
@@ -4788,6 +4834,96 @@
           </a:p>
         </p:txBody>
       </p:sp>
+      <p:pic>
+        <p:nvPicPr>
+          <p:cNvPr id="8" name="Picture 7"/>
+          <p:cNvPicPr>
+            <a:picLocks noChangeAspect="1"/>
+          </p:cNvPicPr>
+          <p:nvPr/>
+        </p:nvPicPr>
+        <p:blipFill>
+          <a:blip r:embed="rId3" cstate="screen">
+            <a:extLst>
+              <a:ext uri="{28A0092B-C50C-407E-A947-70E740481C1C}">
+                <a14:useLocalDpi xmlns:a14="http://schemas.microsoft.com/office/drawing/2010/main"/>
+              </a:ext>
+            </a:extLst>
+          </a:blip>
+          <a:stretch>
+            <a:fillRect/>
+          </a:stretch>
+        </p:blipFill>
+        <p:spPr>
+          <a:xfrm>
+            <a:off x="457200" y="2250674"/>
+            <a:ext cx="2743200" cy="1828800"/>
+          </a:xfrm>
+          <a:prstGeom prst="rect">
+            <a:avLst/>
+          </a:prstGeom>
+        </p:spPr>
+      </p:pic>
+      <p:pic>
+        <p:nvPicPr>
+          <p:cNvPr id="9" name="Picture 8"/>
+          <p:cNvPicPr>
+            <a:picLocks noChangeAspect="1"/>
+          </p:cNvPicPr>
+          <p:nvPr/>
+        </p:nvPicPr>
+        <p:blipFill>
+          <a:blip r:embed="rId4" cstate="screen">
+            <a:extLst>
+              <a:ext uri="{28A0092B-C50C-407E-A947-70E740481C1C}">
+                <a14:useLocalDpi xmlns:a14="http://schemas.microsoft.com/office/drawing/2010/main"/>
+              </a:ext>
+            </a:extLst>
+          </a:blip>
+          <a:stretch>
+            <a:fillRect/>
+          </a:stretch>
+        </p:blipFill>
+        <p:spPr>
+          <a:xfrm>
+            <a:off x="3200400" y="2250676"/>
+            <a:ext cx="2743200" cy="1828800"/>
+          </a:xfrm>
+          <a:prstGeom prst="rect">
+            <a:avLst/>
+          </a:prstGeom>
+        </p:spPr>
+      </p:pic>
+      <p:pic>
+        <p:nvPicPr>
+          <p:cNvPr id="10" name="Picture 9"/>
+          <p:cNvPicPr>
+            <a:picLocks noChangeAspect="1"/>
+          </p:cNvPicPr>
+          <p:nvPr/>
+        </p:nvPicPr>
+        <p:blipFill>
+          <a:blip r:embed="rId5" cstate="screen">
+            <a:extLst>
+              <a:ext uri="{28A0092B-C50C-407E-A947-70E740481C1C}">
+                <a14:useLocalDpi xmlns:a14="http://schemas.microsoft.com/office/drawing/2010/main"/>
+              </a:ext>
+            </a:extLst>
+          </a:blip>
+          <a:stretch>
+            <a:fillRect/>
+          </a:stretch>
+        </p:blipFill>
+        <p:spPr>
+          <a:xfrm>
+            <a:off x="5943600" y="2245705"/>
+            <a:ext cx="2743200" cy="1828800"/>
+          </a:xfrm>
+          <a:prstGeom prst="rect">
+            <a:avLst/>
+          </a:prstGeom>
+        </p:spPr>
+      </p:pic>
     </p:spTree>
   </p:cSld>
   <p:clrMapOvr>
@@ -4796,6 +4932,13 @@
   <p:transition spd="slow">
     <p:cut/>
   </p:transition>
+  <p:timing>
+    <p:tnLst>
+      <p:par>
+        <p:cTn id="1" dur="indefinite" restart="never" nodeType="tmRoot"/>
+      </p:par>
+    </p:tnLst>
+  </p:timing>
 </p:sld>
 </file>
 
@@ -4848,9 +4991,14 @@
               <a:buNone/>
             </a:pPr>
             <a:r>
-              <a:rPr lang="en" sz="3000"/>
-              <a:t>Site 1 (Photosynth)</a:t>
-            </a:r>
+              <a:rPr lang="en" sz="3000" dirty="0"/>
+              <a:t>Site </a:t>
+            </a:r>
+            <a:r>
+              <a:rPr lang="en" sz="3000" dirty="0" smtClean="0"/>
+              <a:t>1: Photosynth of HOPE Outdoor Gallery</a:t>
+            </a:r>
+            <a:endParaRPr lang="en" sz="3000" dirty="0"/>
           </a:p>
         </p:txBody>
       </p:sp>
@@ -4866,8 +5014,8 @@
         </p:nvSpPr>
         <p:spPr>
           <a:xfrm>
-            <a:off x="488850" y="1218375"/>
-            <a:ext cx="8229600" cy="3725699"/>
+            <a:off x="488850" y="4556502"/>
+            <a:ext cx="8229600" cy="387572"/>
           </a:xfrm>
           <a:prstGeom prst="rect">
             <a:avLst/>
@@ -4879,52 +5027,32 @@
           </a:bodyPr>
           <a:lstStyle/>
           <a:p>
-            <a:pPr marL="457200" marR="0" lvl="0" indent="-228600" algn="l" rtl="0">
-              <a:lnSpc>
-                <a:spcPct val="100000"/>
-              </a:lnSpc>
-              <a:spcBef>
-                <a:spcPts val="600"/>
-              </a:spcBef>
-              <a:spcAft>
-                <a:spcPts val="0"/>
-              </a:spcAft>
-              <a:buClr>
-                <a:srgbClr val="000000"/>
-              </a:buClr>
-              <a:buSzPct val="100000"/>
-              <a:buFont typeface="Arial"/>
-            </a:pPr>
-            <a:r>
-              <a:rPr lang="en"/>
-              <a:t>Share a screen shot of the photosynth here</a:t>
-            </a:r>
-          </a:p>
-          <a:p>
-            <a:pPr marL="457200" marR="0" lvl="0" indent="-228600" algn="l" rtl="0">
-              <a:lnSpc>
-                <a:spcPct val="100000"/>
-              </a:lnSpc>
-              <a:spcBef>
-                <a:spcPts val="600"/>
-              </a:spcBef>
-              <a:spcAft>
-                <a:spcPts val="0"/>
-              </a:spcAft>
-            </a:pPr>
-            <a:r>
-              <a:rPr lang="en"/>
-              <a:t>Share a URL/Weblink to the Photosynth (Make it is viewable by anyone!).</a:t>
-            </a:r>
-          </a:p>
-          <a:p>
-            <a:pPr lvl="0" rtl="0">
-              <a:spcBef>
-                <a:spcPts val="0"/>
-              </a:spcBef>
-              <a:buNone/>
-            </a:pPr>
-            <a:endParaRPr/>
+            <a:pPr lvl="0"/>
+            <a:r>
+              <a:rPr lang="en-US" sz="1400" dirty="0" smtClean="0"/>
+              <a:t>Photosynth </a:t>
+            </a:r>
+            <a:r>
+              <a:rPr lang="en-US" sz="1400" dirty="0"/>
+              <a:t>3D: </a:t>
+            </a:r>
+            <a:r>
+              <a:rPr lang="en-US" sz="1400" dirty="0">
+                <a:hlinkClick r:id="rId3"/>
+              </a:rPr>
+              <a:t>https://</a:t>
+            </a:r>
+            <a:r>
+              <a:rPr lang="en-US" sz="1400" dirty="0" smtClean="0">
+                <a:hlinkClick r:id="rId3"/>
+              </a:rPr>
+              <a:t>photosynth.net/preview/view/e905a76e-77e6-4eba-b9d8-c4980d1888e6</a:t>
+            </a:r>
+            <a:endParaRPr lang="en-US" sz="1400" dirty="0" smtClean="0"/>
+          </a:p>
+          <a:p>
+            <a:pPr lvl="0"/>
+            <a:endParaRPr dirty="0"/>
           </a:p>
         </p:txBody>
       </p:sp>
@@ -4970,6 +5098,35 @@
           </a:p>
         </p:txBody>
       </p:sp>
+      <p:pic>
+        <p:nvPicPr>
+          <p:cNvPr id="4" name="Picture 3"/>
+          <p:cNvPicPr>
+            <a:picLocks noChangeAspect="1"/>
+          </p:cNvPicPr>
+          <p:nvPr/>
+        </p:nvPicPr>
+        <p:blipFill rotWithShape="1">
+          <a:blip r:embed="rId4" cstate="screen">
+            <a:extLst>
+              <a:ext uri="{28A0092B-C50C-407E-A947-70E740481C1C}">
+                <a14:useLocalDpi xmlns:a14="http://schemas.microsoft.com/office/drawing/2010/main"/>
+              </a:ext>
+            </a:extLst>
+          </a:blip>
+          <a:srcRect/>
+          <a:stretch/>
+        </p:blipFill>
+        <p:spPr>
+          <a:xfrm>
+            <a:off x="2183843" y="1266888"/>
+            <a:ext cx="4776314" cy="3200400"/>
+          </a:xfrm>
+          <a:prstGeom prst="rect">
+            <a:avLst/>
+          </a:prstGeom>
+        </p:spPr>
+      </p:pic>
     </p:spTree>
   </p:cSld>
   <p:clrMapOvr>
@@ -4978,6 +5135,13 @@
   <p:transition spd="slow">
     <p:cut/>
   </p:transition>
+  <p:timing>
+    <p:tnLst>
+      <p:par>
+        <p:cTn id="1" dur="indefinite" restart="never" nodeType="tmRoot"/>
+      </p:par>
+    </p:tnLst>
+  </p:timing>
 </p:sld>
 </file>
 
@@ -5023,16 +5187,24 @@
           </a:bodyPr>
           <a:lstStyle/>
           <a:p>
-            <a:pPr lvl="0" rtl="0">
-              <a:spcBef>
-                <a:spcPts val="0"/>
-              </a:spcBef>
-              <a:buNone/>
-            </a:pPr>
-            <a:r>
-              <a:rPr lang="en" sz="3000"/>
-              <a:t>Site 2: (Panorama)</a:t>
-            </a:r>
+            <a:pPr lvl="0"/>
+            <a:r>
+              <a:rPr lang="en" sz="3000" dirty="0"/>
+              <a:t>Site 2: </a:t>
+            </a:r>
+            <a:r>
+              <a:rPr lang="en" sz="3000" dirty="0" smtClean="0"/>
+              <a:t>Panorama </a:t>
+            </a:r>
+            <a:r>
+              <a:rPr lang="en" sz="3000" dirty="0"/>
+              <a:t>of Doug Sahm </a:t>
+            </a:r>
+            <a:r>
+              <a:rPr lang="en" sz="3000" dirty="0" smtClean="0"/>
+              <a:t>Hill</a:t>
+            </a:r>
+            <a:endParaRPr lang="en" sz="3000" dirty="0"/>
           </a:p>
         </p:txBody>
       </p:sp>
@@ -5074,9 +5246,18 @@
               <a:buNone/>
             </a:pPr>
             <a:r>
-              <a:rPr lang="en"/>
-              <a:t>How many photographs?</a:t>
-            </a:r>
+              <a:rPr lang="en" sz="2000" i="1" dirty="0"/>
+              <a:t>How many photographs</a:t>
+            </a:r>
+            <a:r>
+              <a:rPr lang="en" sz="2000" i="1" dirty="0" smtClean="0"/>
+              <a:t>? </a:t>
+            </a:r>
+            <a:r>
+              <a:rPr lang="en" sz="2000" dirty="0" smtClean="0"/>
+              <a:t>23 photographs</a:t>
+            </a:r>
+            <a:endParaRPr lang="en" sz="2000" dirty="0"/>
           </a:p>
           <a:p>
             <a:pPr marR="0" algn="l" rtl="0">
@@ -5092,9 +5273,18 @@
               <a:buNone/>
             </a:pPr>
             <a:r>
-              <a:rPr lang="en"/>
-              <a:t>How much of a FOV change was this?</a:t>
-            </a:r>
+              <a:rPr lang="en" sz="2000" i="1" dirty="0"/>
+              <a:t>How much of a FOV change was this</a:t>
+            </a:r>
+            <a:r>
+              <a:rPr lang="en" sz="2000" i="1" dirty="0" smtClean="0"/>
+              <a:t>? ~15</a:t>
+            </a:r>
+            <a:r>
+              <a:rPr lang="en" sz="2000" dirty="0" smtClean="0"/>
+              <a:t>° FOV change</a:t>
+            </a:r>
+            <a:endParaRPr lang="en" sz="2000" i="1" dirty="0"/>
           </a:p>
           <a:p>
             <a:pPr marR="0" algn="l" rtl="0">
@@ -5110,9 +5300,18 @@
               <a:buNone/>
             </a:pPr>
             <a:r>
-              <a:rPr lang="en"/>
-              <a:t>What kind of a Panorama is this?</a:t>
-            </a:r>
+              <a:rPr lang="en" sz="2000" i="1" dirty="0"/>
+              <a:t>What kind of a Panorama is this</a:t>
+            </a:r>
+            <a:r>
+              <a:rPr lang="en" sz="2000" i="1" dirty="0" smtClean="0"/>
+              <a:t>?</a:t>
+            </a:r>
+            <a:r>
+              <a:rPr lang="en" sz="2000" dirty="0" smtClean="0"/>
+              <a:t> 360° Rotational</a:t>
+            </a:r>
+            <a:endParaRPr lang="en" sz="2000" dirty="0"/>
           </a:p>
           <a:p>
             <a:pPr marR="0" lvl="0" algn="l" rtl="0">
@@ -5128,9 +5327,18 @@
               <a:buNone/>
             </a:pPr>
             <a:r>
-              <a:rPr lang="en"/>
-              <a:t>What software did you use?</a:t>
-            </a:r>
+              <a:rPr lang="en" sz="2000" i="1" dirty="0"/>
+              <a:t>What software did you use</a:t>
+            </a:r>
+            <a:r>
+              <a:rPr lang="en" sz="2000" i="1" dirty="0" smtClean="0"/>
+              <a:t>? </a:t>
+            </a:r>
+            <a:r>
+              <a:rPr lang="en" sz="2000" dirty="0" smtClean="0"/>
+              <a:t>Microsoft ICE and Photosynth</a:t>
+            </a:r>
+            <a:endParaRPr lang="en" sz="2000" dirty="0"/>
           </a:p>
           <a:p>
             <a:pPr lvl="0" rtl="0">
@@ -5139,7 +5347,7 @@
               </a:spcBef>
               <a:buNone/>
             </a:pPr>
-            <a:endParaRPr/>
+            <a:endParaRPr dirty="0"/>
           </a:p>
         </p:txBody>
       </p:sp>
@@ -5193,6 +5401,13 @@
   <p:transition spd="slow">
     <p:cut/>
   </p:transition>
+  <p:timing>
+    <p:tnLst>
+      <p:par>
+        <p:cTn id="1" dur="indefinite" restart="never" nodeType="tmRoot"/>
+      </p:par>
+    </p:tnLst>
+  </p:timing>
 </p:sld>
 </file>
 
@@ -5213,6 +5428,36 @@
           <a:chExt cx="0" cy="0"/>
         </a:xfrm>
       </p:grpSpPr>
+      <p:pic>
+        <p:nvPicPr>
+          <p:cNvPr id="2" name="Picture 1"/>
+          <p:cNvPicPr>
+            <a:picLocks noChangeAspect="1"/>
+          </p:cNvPicPr>
+          <p:nvPr/>
+        </p:nvPicPr>
+        <p:blipFill>
+          <a:blip r:embed="rId3" cstate="screen">
+            <a:extLst>
+              <a:ext uri="{28A0092B-C50C-407E-A947-70E740481C1C}">
+                <a14:useLocalDpi xmlns:a14="http://schemas.microsoft.com/office/drawing/2010/main"/>
+              </a:ext>
+            </a:extLst>
+          </a:blip>
+          <a:stretch>
+            <a:fillRect/>
+          </a:stretch>
+        </p:blipFill>
+        <p:spPr>
+          <a:xfrm>
+            <a:off x="2927450" y="2813124"/>
+            <a:ext cx="3200400" cy="2133600"/>
+          </a:xfrm>
+          <a:prstGeom prst="rect">
+            <a:avLst/>
+          </a:prstGeom>
+        </p:spPr>
+      </p:pic>
       <p:sp>
         <p:nvSpPr>
           <p:cNvPr id="65" name="Shape 65"/>
@@ -5245,9 +5490,14 @@
               <a:buNone/>
             </a:pPr>
             <a:r>
-              <a:rPr lang="en" sz="3000"/>
-              <a:t>Site 2 (Panorama)</a:t>
-            </a:r>
+              <a:rPr lang="en" sz="3000" dirty="0"/>
+              <a:t>Site </a:t>
+            </a:r>
+            <a:r>
+              <a:rPr lang="en" sz="3000" dirty="0" smtClean="0"/>
+              <a:t>2: Panorama Input</a:t>
+            </a:r>
+            <a:endParaRPr lang="en" sz="3000" dirty="0"/>
           </a:p>
         </p:txBody>
       </p:sp>
@@ -5276,35 +5526,13 @@
           </a:bodyPr>
           <a:lstStyle/>
           <a:p>
-            <a:pPr marL="457200" marR="0" lvl="0" indent="-228600" algn="l" rtl="0">
-              <a:lnSpc>
-                <a:spcPct val="100000"/>
-              </a:lnSpc>
-              <a:spcBef>
-                <a:spcPts val="600"/>
-              </a:spcBef>
-              <a:spcAft>
-                <a:spcPts val="0"/>
-              </a:spcAft>
-              <a:buClr>
-                <a:srgbClr val="000000"/>
-              </a:buClr>
-              <a:buSzPct val="100000"/>
-              <a:buFont typeface="Arial"/>
+            <a:pPr lvl="0" rtl="0">
+              <a:spcBef>
+                <a:spcPts val="0"/>
+              </a:spcBef>
+              <a:buNone/>
             </a:pPr>
-            <a:r>
-              <a:rPr lang="en"/>
-              <a:t>Share a few selected images of your panorama</a:t>
-            </a:r>
-          </a:p>
-          <a:p>
-            <a:pPr lvl="0" rtl="0">
-              <a:spcBef>
-                <a:spcPts val="0"/>
-              </a:spcBef>
-              <a:buNone/>
-            </a:pPr>
-            <a:endParaRPr/>
+            <a:endParaRPr dirty="0"/>
           </a:p>
         </p:txBody>
       </p:sp>
@@ -5350,6 +5578,66 @@
           </a:p>
         </p:txBody>
       </p:sp>
+      <p:pic>
+        <p:nvPicPr>
+          <p:cNvPr id="3" name="Picture 2"/>
+          <p:cNvPicPr>
+            <a:picLocks noChangeAspect="1"/>
+          </p:cNvPicPr>
+          <p:nvPr/>
+        </p:nvPicPr>
+        <p:blipFill>
+          <a:blip r:embed="rId4" cstate="screen">
+            <a:extLst>
+              <a:ext uri="{28A0092B-C50C-407E-A947-70E740481C1C}">
+                <a14:useLocalDpi xmlns:a14="http://schemas.microsoft.com/office/drawing/2010/main"/>
+              </a:ext>
+            </a:extLst>
+          </a:blip>
+          <a:stretch>
+            <a:fillRect/>
+          </a:stretch>
+        </p:blipFill>
+        <p:spPr>
+          <a:xfrm>
+            <a:off x="5486400" y="1286475"/>
+            <a:ext cx="3200400" cy="2133600"/>
+          </a:xfrm>
+          <a:prstGeom prst="rect">
+            <a:avLst/>
+          </a:prstGeom>
+        </p:spPr>
+      </p:pic>
+      <p:pic>
+        <p:nvPicPr>
+          <p:cNvPr id="4" name="Picture 3"/>
+          <p:cNvPicPr>
+            <a:picLocks noChangeAspect="1"/>
+          </p:cNvPicPr>
+          <p:nvPr/>
+        </p:nvPicPr>
+        <p:blipFill>
+          <a:blip r:embed="rId5" cstate="screen">
+            <a:extLst>
+              <a:ext uri="{28A0092B-C50C-407E-A947-70E740481C1C}">
+                <a14:useLocalDpi xmlns:a14="http://schemas.microsoft.com/office/drawing/2010/main"/>
+              </a:ext>
+            </a:extLst>
+          </a:blip>
+          <a:stretch>
+            <a:fillRect/>
+          </a:stretch>
+        </p:blipFill>
+        <p:spPr>
+          <a:xfrm>
+            <a:off x="457200" y="1304475"/>
+            <a:ext cx="3200400" cy="2133600"/>
+          </a:xfrm>
+          <a:prstGeom prst="rect">
+            <a:avLst/>
+          </a:prstGeom>
+        </p:spPr>
+      </p:pic>
     </p:spTree>
   </p:cSld>
   <p:clrMapOvr>
@@ -5358,6 +5646,13 @@
   <p:transition spd="slow">
     <p:cut/>
   </p:transition>
+  <p:timing>
+    <p:tnLst>
+      <p:par>
+        <p:cTn id="1" dur="indefinite" restart="never" nodeType="tmRoot"/>
+      </p:par>
+    </p:tnLst>
+  </p:timing>
 </p:sld>
 </file>
 
@@ -5385,8 +5680,12 @@
           <p:nvPr/>
         </p:nvPicPr>
         <p:blipFill>
-          <a:blip r:embed="rId3">
-            <a:alphaModFix/>
+          <a:blip r:embed="rId3" cstate="screen">
+            <a:extLst>
+              <a:ext uri="{28A0092B-C50C-407E-A947-70E740481C1C}">
+                <a14:useLocalDpi xmlns:a14="http://schemas.microsoft.com/office/drawing/2010/main"/>
+              </a:ext>
+            </a:extLst>
           </a:blip>
           <a:stretch>
             <a:fillRect/>
@@ -5394,8 +5693,8 @@
         </p:blipFill>
         <p:spPr>
           <a:xfrm>
-            <a:off x="2323675" y="1037800"/>
-            <a:ext cx="4097149" cy="3211175"/>
+            <a:off x="0" y="1193369"/>
+            <a:ext cx="9144000" cy="2696706"/>
           </a:xfrm>
           <a:prstGeom prst="rect">
             <a:avLst/>
@@ -5406,6 +5705,41 @@
           </a:ln>
         </p:spPr>
       </p:pic>
+      <p:sp>
+        <p:nvSpPr>
+          <p:cNvPr id="2" name="Title 1"/>
+          <p:cNvSpPr>
+            <a:spLocks noGrp="1"/>
+          </p:cNvSpPr>
+          <p:nvPr>
+            <p:ph type="title"/>
+          </p:nvPr>
+        </p:nvSpPr>
+        <p:spPr/>
+        <p:txBody>
+          <a:bodyPr/>
+          <a:lstStyle/>
+          <a:p>
+            <a:r>
+              <a:rPr lang="en-US" sz="3000" dirty="0"/>
+              <a:t>Site 2: Panorama Output </a:t>
+            </a:r>
+            <a:r>
+              <a:rPr lang="en-US" sz="1600" dirty="0" smtClean="0"/>
+              <a:t>(</a:t>
+            </a:r>
+            <a:r>
+              <a:rPr lang="en-US" sz="1600" dirty="0"/>
+              <a:t>aspect ratio not preserved</a:t>
+            </a:r>
+            <a:r>
+              <a:rPr lang="en-US" sz="1600" dirty="0" smtClean="0"/>
+              <a:t>)</a:t>
+            </a:r>
+            <a:endParaRPr lang="en-US" sz="1600" dirty="0"/>
+          </a:p>
+        </p:txBody>
+      </p:sp>
       <p:sp>
         <p:nvSpPr>
           <p:cNvPr id="73" name="Shape 73"/>
@@ -5418,8 +5752,8 @@
         </p:nvSpPr>
         <p:spPr>
           <a:xfrm>
-            <a:off x="2988225" y="329100"/>
-            <a:ext cx="2475600" cy="431700"/>
+            <a:off x="457200" y="4020066"/>
+            <a:ext cx="8229600" cy="905783"/>
           </a:xfrm>
           <a:prstGeom prst="rect">
             <a:avLst/>
@@ -5431,63 +5765,71 @@
           </a:bodyPr>
           <a:lstStyle/>
           <a:p>
-            <a:pPr rtl="0">
-              <a:spcBef>
-                <a:spcPts val="0"/>
-              </a:spcBef>
-              <a:buNone/>
-            </a:pPr>
-            <a:r>
-              <a:rPr lang="en"/>
-              <a:t>Your Panorama</a:t>
-            </a:r>
-          </a:p>
-          <a:p>
-            <a:pPr lvl="0" rtl="0">
-              <a:spcBef>
-                <a:spcPts val="0"/>
-              </a:spcBef>
-              <a:buNone/>
-            </a:pPr>
-            <a:endParaRPr/>
-          </a:p>
-        </p:txBody>
-      </p:sp>
-      <p:sp>
-        <p:nvSpPr>
-          <p:cNvPr id="74" name="Shape 74"/>
-          <p:cNvSpPr txBox="1"/>
-          <p:nvPr/>
-        </p:nvSpPr>
-        <p:spPr>
-          <a:xfrm>
-            <a:off x="2554100" y="4356000"/>
-            <a:ext cx="3636300" cy="491700"/>
-          </a:xfrm>
-          <a:prstGeom prst="rect">
-            <a:avLst/>
-          </a:prstGeom>
-          <a:noFill/>
-          <a:ln>
-            <a:noFill/>
-          </a:ln>
-        </p:spPr>
-        <p:txBody>
-          <a:bodyPr lIns="91425" tIns="91425" rIns="91425" bIns="91425" anchor="t" anchorCtr="0">
-            <a:noAutofit/>
-          </a:bodyPr>
-          <a:lstStyle/>
-          <a:p>
-            <a:pPr lvl="0" rtl="0">
-              <a:spcBef>
-                <a:spcPts val="0"/>
-              </a:spcBef>
-              <a:buNone/>
-            </a:pPr>
-            <a:r>
-              <a:rPr lang="en"/>
-              <a:t>Share a link to it. Make sure it is accessible via this link</a:t>
-            </a:r>
+            <a:r>
+              <a:rPr lang="en-US" sz="1400" b="1" dirty="0"/>
+              <a:t>High res: </a:t>
+            </a:r>
+            <a:r>
+              <a:rPr lang="en-US" sz="1400" b="1" dirty="0">
+                <a:hlinkClick r:id="rId4"/>
+              </a:rPr>
+              <a:t>https://</a:t>
+            </a:r>
+            <a:r>
+              <a:rPr lang="en-US" sz="1400" b="1" dirty="0" smtClean="0">
+                <a:hlinkClick r:id="rId4"/>
+              </a:rPr>
+              <a:t>drive.google.com/file/d/0B-9-oKYR8vK2dG16QmlJN2tGekE/view?usp=sharing</a:t>
+            </a:r>
+            <a:endParaRPr lang="en-US" sz="1400" b="1" dirty="0" smtClean="0"/>
+          </a:p>
+          <a:p>
+            <a:r>
+              <a:rPr lang="en-US" sz="1400" b="1" dirty="0" smtClean="0"/>
+              <a:t>Photosynth</a:t>
+            </a:r>
+            <a:r>
+              <a:rPr lang="en-US" sz="1400" b="1" dirty="0"/>
+              <a:t>: </a:t>
+            </a:r>
+            <a:r>
+              <a:rPr lang="en-US" sz="1400" b="1" dirty="0">
+                <a:hlinkClick r:id="rId5"/>
+              </a:rPr>
+              <a:t>https://</a:t>
+            </a:r>
+            <a:r>
+              <a:rPr lang="en-US" sz="1400" b="1" dirty="0" smtClean="0">
+                <a:hlinkClick r:id="rId5"/>
+              </a:rPr>
+              <a:t>photosynth.net/view.aspx?cid=145bf411-bc03-42f6-ade2-9feeb05889f3</a:t>
+            </a:r>
+            <a:endParaRPr lang="en-US" sz="1400" b="1" dirty="0" smtClean="0"/>
+          </a:p>
+          <a:p>
+            <a:r>
+              <a:rPr lang="en-US" sz="1400" b="1" dirty="0" smtClean="0"/>
+              <a:t>Photosynth 3D: </a:t>
+            </a:r>
+            <a:r>
+              <a:rPr lang="en-US" sz="1400" b="1" dirty="0">
+                <a:hlinkClick r:id="rId6"/>
+              </a:rPr>
+              <a:t>https://</a:t>
+            </a:r>
+            <a:r>
+              <a:rPr lang="en-US" sz="1400" b="1" dirty="0" smtClean="0">
+                <a:hlinkClick r:id="rId6"/>
+              </a:rPr>
+              <a:t>photosynth.net/preview/view/ac66ea6f-e3e2-4dcc-90fa-7f15ad819541</a:t>
+            </a:r>
+            <a:endParaRPr lang="en-US" sz="1400" b="1" dirty="0" smtClean="0"/>
+          </a:p>
+          <a:p>
+            <a:endParaRPr lang="en-US" sz="1400" b="1" dirty="0"/>
+          </a:p>
+          <a:p>
+            <a:endParaRPr lang="en-US" sz="1600" b="1" dirty="0" smtClean="0"/>
           </a:p>
         </p:txBody>
       </p:sp>
@@ -5541,6 +5883,13 @@
   <p:transition spd="slow">
     <p:cut/>
   </p:transition>
+  <p:timing>
+    <p:tnLst>
+      <p:par>
+        <p:cTn id="1" dur="indefinite" restart="never" nodeType="tmRoot"/>
+      </p:par>
+    </p:tnLst>
+  </p:timing>
 </p:sld>
 </file>
 
@@ -5731,6 +6080,13 @@
   <p:transition spd="slow">
     <p:cut/>
   </p:transition>
+  <p:timing>
+    <p:tnLst>
+      <p:par>
+        <p:cTn id="1" dur="indefinite" restart="never" nodeType="tmRoot"/>
+      </p:par>
+    </p:tnLst>
+  </p:timing>
 </p:sld>
 </file>
 
@@ -5891,6 +6247,13 @@
   <p:transition spd="slow">
     <p:cut/>
   </p:transition>
+  <p:timing>
+    <p:tnLst>
+      <p:par>
+        <p:cTn id="1" dur="indefinite" restart="never" nodeType="tmRoot"/>
+      </p:par>
+    </p:tnLst>
+  </p:timing>
 </p:sld>
 </file>
 

</xml_diff>